<commit_message>
Fix in gitlab exercise
</commit_message>
<xml_diff>
--- a/slides/Tag-1_5-GitLab-Uebung.pptx
+++ b/slides/Tag-1_5-GitLab-Uebung.pptx
@@ -1329,7 +1329,7 @@
               <a:pPr algn="ctr">
                 <a:defRPr/>
               </a:pPr>
-              <a:t>06.06.2024</a:t>
+              <a:t>10.06.2024</a:t>
             </a:fld>
             <a:endParaRPr lang="de-DE" sz="1000" dirty="0">
               <a:solidFill>
@@ -3791,15 +3791,7 @@
             </a:r>
             <a:r>
               <a:rPr lang="de-DE" altLang="de-DE" dirty="0"/>
-              <a:t>an und führen Sie die notwendigen Änderungen durch, indem Sie eine weitere IF </a:t>
-            </a:r>
-            <a:r>
-              <a:rPr lang="de-DE" altLang="de-DE" dirty="0" err="1"/>
-              <a:t>Condition</a:t>
-            </a:r>
-            <a:r>
-              <a:rPr lang="de-DE" altLang="de-DE" dirty="0"/>
-              <a:t> hinzufügen.</a:t>
+              <a:t>an und führen Sie die notwendigen Änderungen durch.</a:t>
             </a:r>
           </a:p>
           <a:p>
@@ -3937,7 +3929,15 @@
             </a:pPr>
             <a:r>
               <a:rPr lang="de-DE" altLang="de-DE" dirty="0"/>
-              <a:t>In der Zwischenzeit hat ein Kollege die Aufgabe bekommen, den Zahlenbereich von 10 auf 100 zu erhöhen.</a:t>
+              <a:t>In der Zwischenzeit hat ein Kollege die Aufgabe bekommen, den Zahlenbereich von 10 </a:t>
+            </a:r>
+            <a:r>
+              <a:rPr lang="de-DE" altLang="de-DE"/>
+              <a:t>auf 1000 </a:t>
+            </a:r>
+            <a:r>
+              <a:rPr lang="de-DE" altLang="de-DE" dirty="0"/>
+              <a:t>zu erhöhen.</a:t>
             </a:r>
             <a:br>
               <a:rPr lang="de-DE" altLang="de-DE" dirty="0"/>
@@ -4657,7 +4657,7 @@
             </a:br>
             <a:r>
               <a:rPr lang="de-DE" altLang="de-DE" dirty="0"/>
-              <a:t>Kopieren Sie die lokalen Änderungen und fügen sie diese über die Web-GUI in die </a:t>
+              <a:t>Kopieren Sie Ihre lokalen Änderungen bezüglich der Ausgabe und fügen sie diese über die Web-GUI in die </a:t>
             </a:r>
             <a:r>
               <a:rPr lang="de-DE" altLang="de-DE" dirty="0">
@@ -4953,7 +4953,7 @@
             </a:pPr>
             <a:r>
               <a:rPr lang="de-DE" altLang="de-DE" dirty="0"/>
-              <a:t>Lösen Sie den Konflikt, indem Sie sich für eine Ausgabe entscheiden. </a:t>
+              <a:t>Lösen Sie den Konflikt, indem Sie sich für Ihre Ausgabe entscheiden. </a:t>
             </a:r>
           </a:p>
         </p:txBody>
@@ -5969,7 +5969,19 @@
               <a:rPr lang="de-DE" altLang="de-DE" dirty="0">
                 <a:latin typeface="Consolas" panose="020B0609020204030204" pitchFamily="49" charset="0"/>
               </a:rPr>
-              <a:t> -le 11 ]; </a:t>
+              <a:t> -</a:t>
+            </a:r>
+            <a:r>
+              <a:rPr lang="de-DE" altLang="de-DE" dirty="0" err="1">
+                <a:latin typeface="Consolas" panose="020B0609020204030204" pitchFamily="49" charset="0"/>
+              </a:rPr>
+              <a:t>lt</a:t>
+            </a:r>
+            <a:r>
+              <a:rPr lang="de-DE" altLang="de-DE" dirty="0">
+                <a:latin typeface="Consolas" panose="020B0609020204030204" pitchFamily="49" charset="0"/>
+              </a:rPr>
+              <a:t> 11 ]; </a:t>
             </a:r>
             <a:r>
               <a:rPr lang="de-DE" altLang="de-DE" dirty="0" err="1">
@@ -7168,7 +7180,15 @@
             </a:r>
             <a:r>
               <a:rPr lang="de-DE" altLang="de-DE" dirty="0"/>
-              <a:t>-Request und verifizieren Sie, dass die Änderungen auf dem </a:t>
+              <a:t>-Request mit der Option „Delete source </a:t>
+            </a:r>
+            <a:r>
+              <a:rPr lang="de-DE" altLang="de-DE" dirty="0" err="1"/>
+              <a:t>branch</a:t>
+            </a:r>
+            <a:r>
+              <a:rPr lang="de-DE" altLang="de-DE" dirty="0"/>
+              <a:t>“ und verifizieren Sie, dass die Änderungen auf dem </a:t>
             </a:r>
             <a:r>
               <a:rPr lang="de-DE" altLang="de-DE" dirty="0" err="1">
@@ -7181,6 +7201,16 @@
             <a:r>
               <a:rPr lang="de-DE" altLang="de-DE" dirty="0"/>
               <a:t> Branch vorhanden sind.</a:t>
+            </a:r>
+          </a:p>
+          <a:p>
+            <a:pPr marL="457200" indent="-457200">
+              <a:buFont typeface="+mj-lt"/>
+              <a:buAutoNum type="arabicPeriod" startAt="4"/>
+            </a:pPr>
+            <a:r>
+              <a:rPr lang="de-DE" altLang="de-DE" dirty="0"/>
+              <a:t>Löschen Sie Ihren lokalen Branch, da dieser abgeschlossen ist und keine Verwendung mehr besitzt.</a:t>
             </a:r>
           </a:p>
         </p:txBody>

</xml_diff>